<commit_message>
Update need in motivation
</commit_message>
<xml_diff>
--- a/GRAPE/GRAPE.pptx
+++ b/GRAPE/GRAPE.pptx
@@ -3221,15 +3221,7 @@
             </a:pPr>
             <a:r>
               <a:rPr lang="en-US" sz="3000" dirty="0" smtClean="0"/>
-              <a:t>GRAPE is a workflow management system for the </a:t>
-            </a:r>
-            <a:r>
-              <a:rPr lang="en-US" sz="3000" dirty="0" smtClean="0"/>
-              <a:t>organization, processing</a:t>
-            </a:r>
-            <a:r>
-              <a:rPr lang="en-US" sz="3000" dirty="0" smtClean="0"/>
-              <a:t>, analysis and visualization of RNA-</a:t>
+              <a:t>GRAPE is a workflow management system for the organization, processing, analysis and visualization of RNA-</a:t>
             </a:r>
             <a:r>
               <a:rPr lang="en-US" sz="3000" dirty="0" err="1" smtClean="0"/>
@@ -3446,15 +3438,7 @@
             </a:r>
             <a:r>
               <a:rPr lang="en-US" sz="3000" dirty="0" smtClean="0"/>
-              <a:t>ncreasing </a:t>
-            </a:r>
-            <a:r>
-              <a:rPr lang="en-US" sz="3000" dirty="0" smtClean="0"/>
-              <a:t>sequencing throughput from NGS </a:t>
-            </a:r>
-            <a:r>
-              <a:rPr lang="en-US" sz="3000" dirty="0" smtClean="0"/>
-              <a:t>technologies</a:t>
+              <a:t>ncreasing sequencing throughput from NGS technologies</a:t>
             </a:r>
           </a:p>
           <a:p>
@@ -3470,35 +3454,23 @@
             </a:pPr>
             <a:r>
               <a:rPr lang="en-US" sz="3000" dirty="0" smtClean="0"/>
-              <a:t>need </a:t>
+              <a:t>need for fast, accurate and easily automated bioinformatics tools capable of dealing </a:t>
             </a:r>
             <a:r>
               <a:rPr lang="en-US" sz="3000" dirty="0" smtClean="0"/>
-              <a:t>for fast, accurate and easily </a:t>
-            </a:r>
-            <a:r>
-              <a:rPr lang="en-US" sz="3000" dirty="0" smtClean="0"/>
-              <a:t>automated bioinformatics </a:t>
-            </a:r>
-            <a:r>
-              <a:rPr lang="en-US" sz="3000" dirty="0" smtClean="0"/>
-              <a:t>tools capable of dealing </a:t>
-            </a:r>
-            <a:r>
-              <a:rPr lang="en-US" sz="3000" dirty="0" smtClean="0"/>
-              <a:t>with the analysis of </a:t>
-            </a:r>
-            <a:r>
-              <a:rPr lang="en-US" sz="3000" dirty="0" smtClean="0"/>
-              <a:t>massive </a:t>
+              <a:t>with massive </a:t>
             </a:r>
             <a:r>
               <a:rPr lang="en-US" sz="3000" dirty="0" err="1" smtClean="0"/>
               <a:t>RNAseq</a:t>
             </a:r>
             <a:r>
-              <a:rPr lang="en-US" sz="3000" dirty="0" smtClean="0"/>
-              <a:t> data</a:t>
+              <a:rPr lang="en-US" sz="3000" smtClean="0"/>
+              <a:t> </a:t>
+            </a:r>
+            <a:r>
+              <a:rPr lang="en-US" sz="3000" smtClean="0"/>
+              <a:t>datasets</a:t>
             </a:r>
             <a:endParaRPr lang="en-US" sz="3000" dirty="0"/>
           </a:p>
@@ -3601,11 +3573,7 @@
             </a:pPr>
             <a:r>
               <a:rPr lang="en-US" sz="3000" dirty="0" smtClean="0"/>
-              <a:t>The development of a new version of GRAPE has been started in 2013 in order </a:t>
-            </a:r>
-            <a:r>
-              <a:rPr lang="en-US" sz="3000" dirty="0" smtClean="0"/>
-              <a:t>to:</a:t>
+              <a:t>The development of a new version of GRAPE has been started in 2013 in order to:</a:t>
             </a:r>
           </a:p>
           <a:p>
@@ -3716,11 +3684,7 @@
             </a:r>
             <a:r>
               <a:rPr lang="en-US" sz="4000" dirty="0" smtClean="0"/>
-              <a:t>: </a:t>
-            </a:r>
-            <a:r>
-              <a:rPr lang="en-US" sz="4000" dirty="0" smtClean="0"/>
-              <a:t>Main features</a:t>
+              <a:t>: Main features</a:t>
             </a:r>
             <a:endParaRPr lang="en-US" sz="4000" dirty="0"/>
           </a:p>
@@ -3899,15 +3863,7 @@
             </a:r>
             <a:r>
               <a:rPr lang="en-US" sz="2000" b="1" dirty="0" smtClean="0"/>
-              <a:t>      </a:t>
-            </a:r>
-            <a:r>
-              <a:rPr lang="en-US" sz="2000" b="1" dirty="0" smtClean="0"/>
-              <a:t>The </a:t>
-            </a:r>
-            <a:r>
-              <a:rPr lang="en-US" sz="2000" b="1" dirty="0" smtClean="0"/>
-              <a:t>GEM mapper: fast, accurate and versatile alignment by filtration</a:t>
+              <a:t>      The GEM mapper: fast, accurate and versatile alignment by filtration</a:t>
             </a:r>
           </a:p>
           <a:p>
@@ -3920,15 +3876,7 @@
             </a:r>
             <a:r>
               <a:rPr lang="en-US" sz="2000" dirty="0" smtClean="0"/>
-              <a:t>      </a:t>
-            </a:r>
-            <a:r>
-              <a:rPr lang="en-US" sz="2000" dirty="0" smtClean="0"/>
-              <a:t>Santiago </a:t>
-            </a:r>
-            <a:r>
-              <a:rPr lang="en-US" sz="2000" dirty="0" smtClean="0"/>
-              <a:t>Marco-Sola, Michael </a:t>
+              <a:t>      Santiago Marco-Sola, Michael </a:t>
             </a:r>
             <a:r>
               <a:rPr lang="en-US" sz="2000" dirty="0" err="1" smtClean="0"/>
@@ -3970,19 +3918,7 @@
             </a:r>
             <a:r>
               <a:rPr lang="en-US" sz="2000" dirty="0" smtClean="0"/>
-              <a:t>      </a:t>
-            </a:r>
-            <a:r>
-              <a:rPr lang="en-US" sz="2000" dirty="0" smtClean="0"/>
-              <a:t>Nature </a:t>
-            </a:r>
-            <a:r>
-              <a:rPr lang="en-US" sz="2000" dirty="0" smtClean="0"/>
-              <a:t>Methods 9, 1185–1188 (2012) doi:10.1038/nmeth.</a:t>
-            </a:r>
-            <a:r>
-              <a:rPr lang="en-US" sz="2000" dirty="0" smtClean="0"/>
-              <a:t>2221</a:t>
+              <a:t>      Nature Methods 9, 1185–1188 (2012) doi:10.1038/nmeth.2221</a:t>
             </a:r>
           </a:p>
           <a:p>
@@ -3995,11 +3931,7 @@
             </a:r>
             <a:r>
               <a:rPr lang="en-US" sz="2000" dirty="0" smtClean="0"/>
-              <a:t>      </a:t>
-            </a:r>
-            <a:r>
-              <a:rPr lang="en-US" sz="2000" dirty="0" smtClean="0"/>
-              <a:t>Published online 28 October 2012</a:t>
+              <a:t>      Published online 28 October 2012</a:t>
             </a:r>
           </a:p>
           <a:p>
@@ -4027,23 +3959,7 @@
                   <a:srgbClr val="558ED5"/>
                 </a:solidFill>
               </a:rPr>
-              <a:t>     </a:t>
-            </a:r>
-            <a:r>
-              <a:rPr lang="en-US" sz="2400" dirty="0" smtClean="0">
-                <a:solidFill>
-                  <a:srgbClr val="558ED5"/>
-                </a:solidFill>
-              </a:rPr>
-              <a:t>http</a:t>
-            </a:r>
-            <a:r>
-              <a:rPr lang="en-US" sz="2400" dirty="0" smtClean="0">
-                <a:solidFill>
-                  <a:srgbClr val="558ED5"/>
-                </a:solidFill>
-              </a:rPr>
-              <a:t>://</a:t>
+              <a:t>     http://</a:t>
             </a:r>
             <a:r>
               <a:rPr lang="en-US" sz="2400" dirty="0" err="1" smtClean="0">
@@ -4094,10 +4010,10 @@
                   </a:schemeClr>
                 </a:solidFill>
               </a:rPr>
-              <a:t>http</a:t>
-            </a:r>
-            <a:r>
-              <a:rPr lang="en-US" sz="2400" dirty="0" smtClean="0">
+              <a:t>http://</a:t>
+            </a:r>
+            <a:r>
+              <a:rPr lang="en-US" sz="2400" dirty="0" err="1" smtClean="0">
                 <a:solidFill>
                   <a:schemeClr val="tx2">
                     <a:lumMod val="60000"/>
@@ -4105,10 +4021,10 @@
                   </a:schemeClr>
                 </a:solidFill>
               </a:rPr>
-              <a:t>://</a:t>
-            </a:r>
-            <a:r>
-              <a:rPr lang="en-US" sz="2400" dirty="0" err="1" smtClean="0">
+              <a:t>sammeth.net</a:t>
+            </a:r>
+            <a:r>
+              <a:rPr lang="en-US" sz="2400" dirty="0" smtClean="0">
                 <a:solidFill>
                   <a:schemeClr val="tx2">
                     <a:lumMod val="60000"/>
@@ -4116,28 +4032,13 @@
                   </a:schemeClr>
                 </a:solidFill>
               </a:rPr>
-              <a:t>sammeth.net</a:t>
-            </a:r>
-            <a:r>
-              <a:rPr lang="en-US" sz="2400" dirty="0" smtClean="0">
-                <a:solidFill>
-                  <a:schemeClr val="tx2">
-                    <a:lumMod val="60000"/>
-                    <a:lumOff val="40000"/>
-                  </a:schemeClr>
-                </a:solidFill>
-              </a:rPr>
               <a:t>/confluence/display/FLUX/Home</a:t>
             </a:r>
           </a:p>
           <a:p>
             <a:r>
               <a:rPr lang="en-US" sz="3000" dirty="0" smtClean="0"/>
-              <a:t>IPSA: Integrative pipeline for splicing </a:t>
-            </a:r>
-            <a:r>
-              <a:rPr lang="en-US" sz="3000" dirty="0" smtClean="0"/>
-              <a:t>analyses</a:t>
+              <a:t>IPSA: Integrative pipeline for splicing analyses</a:t>
             </a:r>
           </a:p>
           <a:p>
@@ -4285,11 +4186,7 @@
             </a:r>
             <a:r>
               <a:rPr lang="en-US" sz="4000" dirty="0" smtClean="0"/>
-              <a:t>: </a:t>
-            </a:r>
-            <a:r>
-              <a:rPr lang="en-US" sz="4000" dirty="0" smtClean="0"/>
-              <a:t>Work in progress</a:t>
+              <a:t>: Work in progress</a:t>
             </a:r>
             <a:endParaRPr lang="en-US" sz="4000" dirty="0"/>
           </a:p>

</xml_diff>